<commit_message>
Add Meanwell RSP320-24 PSU holder. CAD recolor. Changelog update
</commit_message>
<xml_diff>
--- a/PICTURES/CrossSections.pptx
+++ b/PICTURES/CrossSections.pptx
@@ -105,6 +105,11 @@
       </a:defRPr>
     </a:lvl9pPr>
   </p:defaultTextStyle>
+  <p:extLst>
+    <p:ext uri="{EFAFB233-063F-42B5-8137-9DF3F51BA10A}">
+      <p15:sldGuideLst xmlns:p15="http://schemas.microsoft.com/office/powerpoint/2012/main"/>
+    </p:ext>
+  </p:extLst>
 </p:presentation>
 </file>
 
@@ -257,7 +262,7 @@
           <a:p>
             <a:fld id="{4929A3BE-99D0-4243-BB6D-06AC2FAF1AA2}" type="datetimeFigureOut">
               <a:rPr lang="en-150" smtClean="0"/>
-              <a:t>10/04/2023</a:t>
+              <a:t>13/04/2023</a:t>
             </a:fld>
             <a:endParaRPr lang="en-150"/>
           </a:p>
@@ -457,7 +462,7 @@
           <a:p>
             <a:fld id="{4929A3BE-99D0-4243-BB6D-06AC2FAF1AA2}" type="datetimeFigureOut">
               <a:rPr lang="en-150" smtClean="0"/>
-              <a:t>10/04/2023</a:t>
+              <a:t>13/04/2023</a:t>
             </a:fld>
             <a:endParaRPr lang="en-150"/>
           </a:p>
@@ -667,7 +672,7 @@
           <a:p>
             <a:fld id="{4929A3BE-99D0-4243-BB6D-06AC2FAF1AA2}" type="datetimeFigureOut">
               <a:rPr lang="en-150" smtClean="0"/>
-              <a:t>10/04/2023</a:t>
+              <a:t>13/04/2023</a:t>
             </a:fld>
             <a:endParaRPr lang="en-150"/>
           </a:p>
@@ -867,7 +872,7 @@
           <a:p>
             <a:fld id="{4929A3BE-99D0-4243-BB6D-06AC2FAF1AA2}" type="datetimeFigureOut">
               <a:rPr lang="en-150" smtClean="0"/>
-              <a:t>10/04/2023</a:t>
+              <a:t>13/04/2023</a:t>
             </a:fld>
             <a:endParaRPr lang="en-150"/>
           </a:p>
@@ -1143,7 +1148,7 @@
           <a:p>
             <a:fld id="{4929A3BE-99D0-4243-BB6D-06AC2FAF1AA2}" type="datetimeFigureOut">
               <a:rPr lang="en-150" smtClean="0"/>
-              <a:t>10/04/2023</a:t>
+              <a:t>13/04/2023</a:t>
             </a:fld>
             <a:endParaRPr lang="en-150"/>
           </a:p>
@@ -1411,7 +1416,7 @@
           <a:p>
             <a:fld id="{4929A3BE-99D0-4243-BB6D-06AC2FAF1AA2}" type="datetimeFigureOut">
               <a:rPr lang="en-150" smtClean="0"/>
-              <a:t>10/04/2023</a:t>
+              <a:t>13/04/2023</a:t>
             </a:fld>
             <a:endParaRPr lang="en-150"/>
           </a:p>
@@ -1826,7 +1831,7 @@
           <a:p>
             <a:fld id="{4929A3BE-99D0-4243-BB6D-06AC2FAF1AA2}" type="datetimeFigureOut">
               <a:rPr lang="en-150" smtClean="0"/>
-              <a:t>10/04/2023</a:t>
+              <a:t>13/04/2023</a:t>
             </a:fld>
             <a:endParaRPr lang="en-150"/>
           </a:p>
@@ -1968,7 +1973,7 @@
           <a:p>
             <a:fld id="{4929A3BE-99D0-4243-BB6D-06AC2FAF1AA2}" type="datetimeFigureOut">
               <a:rPr lang="en-150" smtClean="0"/>
-              <a:t>10/04/2023</a:t>
+              <a:t>13/04/2023</a:t>
             </a:fld>
             <a:endParaRPr lang="en-150"/>
           </a:p>
@@ -2081,7 +2086,7 @@
           <a:p>
             <a:fld id="{4929A3BE-99D0-4243-BB6D-06AC2FAF1AA2}" type="datetimeFigureOut">
               <a:rPr lang="en-150" smtClean="0"/>
-              <a:t>10/04/2023</a:t>
+              <a:t>13/04/2023</a:t>
             </a:fld>
             <a:endParaRPr lang="en-150"/>
           </a:p>
@@ -2394,7 +2399,7 @@
           <a:p>
             <a:fld id="{4929A3BE-99D0-4243-BB6D-06AC2FAF1AA2}" type="datetimeFigureOut">
               <a:rPr lang="en-150" smtClean="0"/>
-              <a:t>10/04/2023</a:t>
+              <a:t>13/04/2023</a:t>
             </a:fld>
             <a:endParaRPr lang="en-150"/>
           </a:p>
@@ -2683,7 +2688,7 @@
           <a:p>
             <a:fld id="{4929A3BE-99D0-4243-BB6D-06AC2FAF1AA2}" type="datetimeFigureOut">
               <a:rPr lang="en-150" smtClean="0"/>
-              <a:t>10/04/2023</a:t>
+              <a:t>13/04/2023</a:t>
             </a:fld>
             <a:endParaRPr lang="en-150"/>
           </a:p>
@@ -2926,7 +2931,7 @@
           <a:p>
             <a:fld id="{4929A3BE-99D0-4243-BB6D-06AC2FAF1AA2}" type="datetimeFigureOut">
               <a:rPr lang="en-150" smtClean="0"/>
-              <a:t>10/04/2023</a:t>
+              <a:t>13/04/2023</a:t>
             </a:fld>
             <a:endParaRPr lang="en-150"/>
           </a:p>
@@ -3343,76 +3348,6 @@
           <a:chExt cx="0" cy="0"/>
         </a:xfrm>
       </p:grpSpPr>
-      <p:pic>
-        <p:nvPicPr>
-          <p:cNvPr id="5" name="Picture 4" descr="A picture containing text, different&#10;&#10;Description automatically generated">
-            <a:extLst>
-              <a:ext uri="{FF2B5EF4-FFF2-40B4-BE49-F238E27FC236}">
-                <a16:creationId xmlns:a16="http://schemas.microsoft.com/office/drawing/2014/main" id="{8305440E-C12E-72A7-B7E2-04062EDA30B5}"/>
-              </a:ext>
-            </a:extLst>
-          </p:cNvPr>
-          <p:cNvPicPr>
-            <a:picLocks noChangeAspect="1"/>
-          </p:cNvPicPr>
-          <p:nvPr/>
-        </p:nvPicPr>
-        <p:blipFill rotWithShape="1">
-          <a:blip r:embed="rId2">
-            <a:extLst>
-              <a:ext uri="{28A0092B-C50C-407E-A947-70E740481C1C}">
-                <a14:useLocalDpi xmlns:a14="http://schemas.microsoft.com/office/drawing/2010/main" val="0"/>
-              </a:ext>
-            </a:extLst>
-          </a:blip>
-          <a:srcRect t="35073" r="6642" b="36328"/>
-          <a:stretch/>
-        </p:blipFill>
-        <p:spPr>
-          <a:xfrm>
-            <a:off x="3721785" y="550651"/>
-            <a:ext cx="8165415" cy="2438397"/>
-          </a:xfrm>
-          <a:prstGeom prst="rect">
-            <a:avLst/>
-          </a:prstGeom>
-        </p:spPr>
-      </p:pic>
-      <p:pic>
-        <p:nvPicPr>
-          <p:cNvPr id="7" name="Picture 6" descr="Text&#10;&#10;Description automatically generated with low confidence">
-            <a:extLst>
-              <a:ext uri="{FF2B5EF4-FFF2-40B4-BE49-F238E27FC236}">
-                <a16:creationId xmlns:a16="http://schemas.microsoft.com/office/drawing/2014/main" id="{E099BFB1-D7BC-1AE2-AD5B-660213DB3727}"/>
-              </a:ext>
-            </a:extLst>
-          </p:cNvPr>
-          <p:cNvPicPr>
-            <a:picLocks noChangeAspect="1"/>
-          </p:cNvPicPr>
-          <p:nvPr/>
-        </p:nvPicPr>
-        <p:blipFill rotWithShape="1">
-          <a:blip r:embed="rId3">
-            <a:extLst>
-              <a:ext uri="{28A0092B-C50C-407E-A947-70E740481C1C}">
-                <a14:useLocalDpi xmlns:a14="http://schemas.microsoft.com/office/drawing/2010/main" val="0"/>
-              </a:ext>
-            </a:extLst>
-          </a:blip>
-          <a:srcRect l="6842" t="35161" r="4193" b="21948"/>
-          <a:stretch/>
-        </p:blipFill>
-        <p:spPr>
-          <a:xfrm>
-            <a:off x="3617797" y="3732245"/>
-            <a:ext cx="8118132" cy="2836378"/>
-          </a:xfrm>
-          <a:prstGeom prst="rect">
-            <a:avLst/>
-          </a:prstGeom>
-        </p:spPr>
-      </p:pic>
       <p:sp>
         <p:nvSpPr>
           <p:cNvPr id="9" name="TextBox 8">
@@ -3543,6 +3478,78 @@
           </a:p>
         </p:txBody>
       </p:sp>
+      <p:pic>
+        <p:nvPicPr>
+          <p:cNvPr id="3" name="Picture 2" descr="A picture containing text, screenshot&#10;&#10;Description automatically generated">
+            <a:extLst>
+              <a:ext uri="{FF2B5EF4-FFF2-40B4-BE49-F238E27FC236}">
+                <a16:creationId xmlns:a16="http://schemas.microsoft.com/office/drawing/2014/main" id="{758ED27D-ACFB-3A37-7166-928B14DA7424}"/>
+              </a:ext>
+            </a:extLst>
+          </p:cNvPr>
+          <p:cNvPicPr>
+            <a:picLocks noChangeAspect="1"/>
+          </p:cNvPicPr>
+          <p:nvPr/>
+        </p:nvPicPr>
+        <p:blipFill>
+          <a:blip r:embed="rId2">
+            <a:extLst>
+              <a:ext uri="{28A0092B-C50C-407E-A947-70E740481C1C}">
+                <a14:useLocalDpi xmlns:a14="http://schemas.microsoft.com/office/drawing/2010/main" val="0"/>
+              </a:ext>
+            </a:extLst>
+          </a:blip>
+          <a:stretch>
+            <a:fillRect/>
+          </a:stretch>
+        </p:blipFill>
+        <p:spPr>
+          <a:xfrm>
+            <a:off x="3814338" y="3581961"/>
+            <a:ext cx="8052482" cy="2658417"/>
+          </a:xfrm>
+          <a:prstGeom prst="rect">
+            <a:avLst/>
+          </a:prstGeom>
+        </p:spPr>
+      </p:pic>
+      <p:pic>
+        <p:nvPicPr>
+          <p:cNvPr id="10" name="Picture 9" descr="A picture containing text, device, measuring stick, caliper&#10;&#10;Description automatically generated">
+            <a:extLst>
+              <a:ext uri="{FF2B5EF4-FFF2-40B4-BE49-F238E27FC236}">
+                <a16:creationId xmlns:a16="http://schemas.microsoft.com/office/drawing/2014/main" id="{96649E60-AE0C-80E8-69C9-8636E667BF18}"/>
+              </a:ext>
+            </a:extLst>
+          </p:cNvPr>
+          <p:cNvPicPr>
+            <a:picLocks noChangeAspect="1"/>
+          </p:cNvPicPr>
+          <p:nvPr/>
+        </p:nvPicPr>
+        <p:blipFill>
+          <a:blip r:embed="rId3">
+            <a:extLst>
+              <a:ext uri="{28A0092B-C50C-407E-A947-70E740481C1C}">
+                <a14:useLocalDpi xmlns:a14="http://schemas.microsoft.com/office/drawing/2010/main" val="0"/>
+              </a:ext>
+            </a:extLst>
+          </a:blip>
+          <a:stretch>
+            <a:fillRect/>
+          </a:stretch>
+        </p:blipFill>
+        <p:spPr>
+          <a:xfrm>
+            <a:off x="4222757" y="834463"/>
+            <a:ext cx="7644063" cy="2120560"/>
+          </a:xfrm>
+          <a:prstGeom prst="rect">
+            <a:avLst/>
+          </a:prstGeom>
+        </p:spPr>
+      </p:pic>
     </p:spTree>
     <p:extLst>
       <p:ext uri="{BB962C8B-B14F-4D97-AF65-F5344CB8AC3E}">
@@ -3611,10 +3618,10 @@
       </p:sp>
       <p:pic>
         <p:nvPicPr>
-          <p:cNvPr id="3" name="Picture 2" descr="Icon&#10;&#10;Description automatically generated">
-            <a:extLst>
-              <a:ext uri="{FF2B5EF4-FFF2-40B4-BE49-F238E27FC236}">
-                <a16:creationId xmlns:a16="http://schemas.microsoft.com/office/drawing/2014/main" id="{C80F610E-B45A-2687-3079-016060BD70FB}"/>
+          <p:cNvPr id="4" name="Picture 3" descr="A picture containing rectangle&#10;&#10;Description automatically generated">
+            <a:extLst>
+              <a:ext uri="{FF2B5EF4-FFF2-40B4-BE49-F238E27FC236}">
+                <a16:creationId xmlns:a16="http://schemas.microsoft.com/office/drawing/2014/main" id="{8801FA1D-5C98-B5F4-F8F8-FB98E96B9964}"/>
               </a:ext>
             </a:extLst>
           </p:cNvPr>
@@ -3637,8 +3644,8 @@
         </p:blipFill>
         <p:spPr>
           <a:xfrm>
-            <a:off x="1193115" y="1350671"/>
-            <a:ext cx="4748975" cy="4184323"/>
+            <a:off x="6095999" y="1789474"/>
+            <a:ext cx="4835567" cy="4028746"/>
           </a:xfrm>
           <a:prstGeom prst="rect">
             <a:avLst/>
@@ -3647,10 +3654,10 @@
       </p:pic>
       <p:pic>
         <p:nvPicPr>
-          <p:cNvPr id="6" name="Picture 5" descr="Icon&#10;&#10;Description automatically generated">
-            <a:extLst>
-              <a:ext uri="{FF2B5EF4-FFF2-40B4-BE49-F238E27FC236}">
-                <a16:creationId xmlns:a16="http://schemas.microsoft.com/office/drawing/2014/main" id="{169924CB-15EE-BE7D-9AA6-5E1C22A121BA}"/>
+          <p:cNvPr id="7" name="Picture 6" descr="A picture containing text&#10;&#10;Description automatically generated">
+            <a:extLst>
+              <a:ext uri="{FF2B5EF4-FFF2-40B4-BE49-F238E27FC236}">
+                <a16:creationId xmlns:a16="http://schemas.microsoft.com/office/drawing/2014/main" id="{ED573AFD-433B-ECBB-4A34-60813C886612}"/>
               </a:ext>
             </a:extLst>
           </p:cNvPr>
@@ -3673,8 +3680,8 @@
         </p:blipFill>
         <p:spPr>
           <a:xfrm>
-            <a:off x="6249910" y="1341146"/>
-            <a:ext cx="4748975" cy="4211989"/>
+            <a:off x="971861" y="1789474"/>
+            <a:ext cx="4522610" cy="4028746"/>
           </a:xfrm>
           <a:prstGeom prst="rect">
             <a:avLst/>

</xml_diff>